<commit_message>
12/09/2020 Add Boss, Character can Block Bullet
</commit_message>
<xml_diff>
--- a/RELEASE and DESIGN/Design/IdealGame.pptx
+++ b/RELEASE and DESIGN/Design/IdealGame.pptx
@@ -9,9 +9,8 @@
     <p:sldId id="256" r:id="rId3"/>
     <p:sldId id="257" r:id="rId4"/>
     <p:sldId id="260" r:id="rId5"/>
-    <p:sldId id="262" r:id="rId6"/>
-    <p:sldId id="261" r:id="rId7"/>
-    <p:sldId id="258" r:id="rId8"/>
+    <p:sldId id="261" r:id="rId6"/>
+    <p:sldId id="258" r:id="rId7"/>
   </p:sldIdLst>
   <p:sldSz cx="9144000" cy="6858000" type="screen4x3"/>
   <p:notesSz cx="6858000" cy="9144000"/>
@@ -295,7 +294,7 @@
             <a:fld id="{1D8BD707-D9CF-40AE-B4C6-C98DA3205C09}" type="datetimeFigureOut">
               <a:rPr lang="en-US" smtClean="0"/>
               <a:pPr/>
-              <a:t>9/8/2020</a:t>
+              <a:t>9/12/2020</a:t>
             </a:fld>
             <a:endParaRPr lang="en-US"/>
           </a:p>
@@ -462,7 +461,7 @@
             <a:fld id="{1D8BD707-D9CF-40AE-B4C6-C98DA3205C09}" type="datetimeFigureOut">
               <a:rPr lang="en-US" smtClean="0"/>
               <a:pPr/>
-              <a:t>9/8/2020</a:t>
+              <a:t>9/12/2020</a:t>
             </a:fld>
             <a:endParaRPr lang="en-US"/>
           </a:p>
@@ -639,7 +638,7 @@
             <a:fld id="{1D8BD707-D9CF-40AE-B4C6-C98DA3205C09}" type="datetimeFigureOut">
               <a:rPr lang="en-US" smtClean="0"/>
               <a:pPr/>
-              <a:t>9/8/2020</a:t>
+              <a:t>9/12/2020</a:t>
             </a:fld>
             <a:endParaRPr lang="en-US"/>
           </a:p>
@@ -806,7 +805,7 @@
             <a:fld id="{1D8BD707-D9CF-40AE-B4C6-C98DA3205C09}" type="datetimeFigureOut">
               <a:rPr lang="en-US" smtClean="0"/>
               <a:pPr/>
-              <a:t>9/8/2020</a:t>
+              <a:t>9/12/2020</a:t>
             </a:fld>
             <a:endParaRPr lang="en-US"/>
           </a:p>
@@ -1049,7 +1048,7 @@
             <a:fld id="{1D8BD707-D9CF-40AE-B4C6-C98DA3205C09}" type="datetimeFigureOut">
               <a:rPr lang="en-US" smtClean="0"/>
               <a:pPr/>
-              <a:t>9/8/2020</a:t>
+              <a:t>9/12/2020</a:t>
             </a:fld>
             <a:endParaRPr lang="en-US"/>
           </a:p>
@@ -1334,7 +1333,7 @@
             <a:fld id="{1D8BD707-D9CF-40AE-B4C6-C98DA3205C09}" type="datetimeFigureOut">
               <a:rPr lang="en-US" smtClean="0"/>
               <a:pPr/>
-              <a:t>9/8/2020</a:t>
+              <a:t>9/12/2020</a:t>
             </a:fld>
             <a:endParaRPr lang="en-US"/>
           </a:p>
@@ -1753,7 +1752,7 @@
             <a:fld id="{1D8BD707-D9CF-40AE-B4C6-C98DA3205C09}" type="datetimeFigureOut">
               <a:rPr lang="en-US" smtClean="0"/>
               <a:pPr/>
-              <a:t>9/8/2020</a:t>
+              <a:t>9/12/2020</a:t>
             </a:fld>
             <a:endParaRPr lang="en-US"/>
           </a:p>
@@ -1868,7 +1867,7 @@
             <a:fld id="{1D8BD707-D9CF-40AE-B4C6-C98DA3205C09}" type="datetimeFigureOut">
               <a:rPr lang="en-US" smtClean="0"/>
               <a:pPr/>
-              <a:t>9/8/2020</a:t>
+              <a:t>9/12/2020</a:t>
             </a:fld>
             <a:endParaRPr lang="en-US"/>
           </a:p>
@@ -1960,7 +1959,7 @@
             <a:fld id="{1D8BD707-D9CF-40AE-B4C6-C98DA3205C09}" type="datetimeFigureOut">
               <a:rPr lang="en-US" smtClean="0"/>
               <a:pPr/>
-              <a:t>9/8/2020</a:t>
+              <a:t>9/12/2020</a:t>
             </a:fld>
             <a:endParaRPr lang="en-US"/>
           </a:p>
@@ -2234,7 +2233,7 @@
             <a:fld id="{1D8BD707-D9CF-40AE-B4C6-C98DA3205C09}" type="datetimeFigureOut">
               <a:rPr lang="en-US" smtClean="0"/>
               <a:pPr/>
-              <a:t>9/8/2020</a:t>
+              <a:t>9/12/2020</a:t>
             </a:fld>
             <a:endParaRPr lang="en-US"/>
           </a:p>
@@ -2484,7 +2483,7 @@
             <a:fld id="{1D8BD707-D9CF-40AE-B4C6-C98DA3205C09}" type="datetimeFigureOut">
               <a:rPr lang="en-US" smtClean="0"/>
               <a:pPr/>
-              <a:t>9/8/2020</a:t>
+              <a:t>9/12/2020</a:t>
             </a:fld>
             <a:endParaRPr lang="en-US"/>
           </a:p>
@@ -2694,7 +2693,7 @@
             <a:fld id="{1D8BD707-D9CF-40AE-B4C6-C98DA3205C09}" type="datetimeFigureOut">
               <a:rPr lang="en-US" smtClean="0"/>
               <a:pPr/>
-              <a:t>9/8/2020</a:t>
+              <a:t>9/12/2020</a:t>
             </a:fld>
             <a:endParaRPr lang="en-US"/>
           </a:p>
@@ -3454,15 +3453,7 @@
                       </a:r>
                       <a:r>
                         <a:rPr lang="en-US" baseline="0" dirty="0" smtClean="0"/>
-                        <a:t> vật kiểm được </a:t>
-                      </a:r>
-                      <a:r>
-                        <a:rPr lang="en-US" baseline="0" dirty="0" smtClean="0"/>
-                        <a:t>tiền (Banana Coin) </a:t>
-                      </a:r>
-                      <a:r>
-                        <a:rPr lang="en-US" baseline="0" dirty="0" smtClean="0"/>
-                        <a:t>qua mỗi màn chơi có thể nâng cấp máu hoặc sát thương.</a:t>
+                        <a:t> vật kiểm được tiền (Banana Coin) qua mỗi màn chơi có thể nâng cấp máu hoặc sát thương.</a:t>
                       </a:r>
                       <a:endParaRPr lang="en-US" dirty="0"/>
                     </a:p>
@@ -3484,29 +3475,13 @@
                     <a:p>
                       <a:r>
                         <a:rPr lang="en-US" baseline="0" dirty="0" smtClean="0"/>
-                        <a:t>+loại </a:t>
-                      </a:r>
-                      <a:r>
-                        <a:rPr lang="en-US" baseline="0" dirty="0" smtClean="0"/>
-                        <a:t>1(Cherries_Flash): </a:t>
-                      </a:r>
-                      <a:r>
-                        <a:rPr lang="en-US" baseline="0" dirty="0" smtClean="0"/>
-                        <a:t>cho nhân vật khả năng né (mỗi lần né 1 vật phẩm)</a:t>
+                        <a:t>+loại 1(Cherries_Flash): cho nhân vật khả năng né (mỗi lần né 1 vật phẩm)</a:t>
                       </a:r>
                     </a:p>
                     <a:p>
                       <a:r>
                         <a:rPr lang="en-US" baseline="0" dirty="0" smtClean="0"/>
-                        <a:t>+loại </a:t>
-                      </a:r>
-                      <a:r>
-                        <a:rPr lang="en-US" baseline="0" dirty="0" smtClean="0"/>
-                        <a:t>2(Melon_BlockBullet): </a:t>
-                      </a:r>
-                      <a:r>
-                        <a:rPr lang="en-US" baseline="0" dirty="0" smtClean="0"/>
-                        <a:t>cho nhân vật khả năng đánh ngược lại đạn khi đánh ( đỡ thành công trừ 1 vật phẩm)</a:t>
+                        <a:t>+loại 2(Melon_BlockBullet): cho nhân vật khả năng đánh ngược lại đạn khi đánh ( đỡ thành công trừ 1 vật phẩm)</a:t>
                       </a:r>
                     </a:p>
                     <a:p>
@@ -3764,47 +3739,6 @@
           </a:extLst>
         </p:spPr>
       </p:pic>
-      <p:pic>
-        <p:nvPicPr>
-          <p:cNvPr id="3075" name="Picture 3" descr="E:\HocTap\Documents\ThucTap\GameLoftTHUCTAP\IdealAndAsset\Asset\free-pixel-art-tiny-hero-sprites\2 Owlet_Monster\Owlet_Monster.png"/>
-          <p:cNvPicPr>
-            <a:picLocks noChangeAspect="1" noChangeArrowheads="1"/>
-          </p:cNvPicPr>
-          <p:nvPr/>
-        </p:nvPicPr>
-        <p:blipFill>
-          <a:blip r:embed="rId3">
-            <a:extLst>
-              <a:ext uri="{28A0092B-C50C-407E-A947-70E740481C1C}">
-                <a14:useLocalDpi xmlns:a14="http://schemas.microsoft.com/office/drawing/2010/main" val="0"/>
-              </a:ext>
-            </a:extLst>
-          </a:blip>
-          <a:srcRect/>
-          <a:stretch>
-            <a:fillRect/>
-          </a:stretch>
-        </p:blipFill>
-        <p:spPr bwMode="auto">
-          <a:xfrm>
-            <a:off x="5562600" y="3886200"/>
-            <a:ext cx="2125662" cy="2125662"/>
-          </a:xfrm>
-          <a:prstGeom prst="rect">
-            <a:avLst/>
-          </a:prstGeom>
-          <a:noFill/>
-          <a:extLst>
-            <a:ext uri="{909E8E84-426E-40DD-AFC4-6F175D3DCCD1}">
-              <a14:hiddenFill xmlns:a14="http://schemas.microsoft.com/office/drawing/2010/main">
-                <a:solidFill>
-                  <a:srgbClr val="FFFFFF"/>
-                </a:solidFill>
-              </a14:hiddenFill>
-            </a:ext>
-          </a:extLst>
-        </p:spPr>
-      </p:pic>
     </p:spTree>
     <p:extLst>
       <p:ext uri="{BB962C8B-B14F-4D97-AF65-F5344CB8AC3E}">
@@ -3859,7 +3793,7 @@
           <a:p>
             <a:r>
               <a:rPr lang="en-US" dirty="0" smtClean="0"/>
-              <a:t>Bẫy</a:t>
+              <a:t>Boss</a:t>
             </a:r>
             <a:endParaRPr lang="en-US" dirty="0"/>
           </a:p>
@@ -3874,271 +3808,7 @@
           <p:nvPr>
             <p:extLst>
               <p:ext uri="{D42A27DB-BD31-4B8C-83A1-F6EECF244321}">
-                <p14:modId xmlns:p14="http://schemas.microsoft.com/office/powerpoint/2010/main" val="417422675"/>
-              </p:ext>
-            </p:extLst>
-          </p:nvPr>
-        </p:nvGraphicFramePr>
-        <p:xfrm>
-          <a:off x="838200" y="1524000"/>
-          <a:ext cx="3581400" cy="4480317"/>
-        </p:xfrm>
-        <a:graphic>
-          <a:graphicData uri="http://schemas.openxmlformats.org/drawingml/2006/table">
-            <a:tbl>
-              <a:tblPr firstRow="1" bandRow="1">
-                <a:tableStyleId>{5C22544A-7EE6-4342-B048-85BDC9FD1C3A}</a:tableStyleId>
-              </a:tblPr>
-              <a:tblGrid>
-                <a:gridCol w="3581400"/>
-              </a:tblGrid>
-              <a:tr h="1919755">
-                <a:tc>
-                  <a:txBody>
-                    <a:bodyPr/>
-                    <a:lstStyle/>
-                    <a:p>
-                      <a:r>
-                        <a:rPr lang="en-US" dirty="0" smtClean="0"/>
-                        <a:t>Bẫy</a:t>
-                      </a:r>
-                      <a:r>
-                        <a:rPr lang="en-US" baseline="0" dirty="0" smtClean="0"/>
-                        <a:t> có sát thương vô hạn (chạm là chết) </a:t>
-                      </a:r>
-                    </a:p>
-                  </a:txBody>
-                  <a:tcPr/>
-                </a:tc>
-              </a:tr>
-              <a:tr h="1097522">
-                <a:tc>
-                  <a:txBody>
-                    <a:bodyPr/>
-                    <a:lstStyle/>
-                    <a:p>
-                      <a:r>
-                        <a:rPr lang="en-US" dirty="0" smtClean="0"/>
-                        <a:t>Bẫy</a:t>
-                      </a:r>
-                      <a:r>
-                        <a:rPr lang="en-US" baseline="0" dirty="0" smtClean="0"/>
-                        <a:t> có nhiều loại:</a:t>
-                      </a:r>
-                    </a:p>
-                    <a:p>
-                      <a:pPr marL="285750" indent="-285750">
-                        <a:buFontTx/>
-                        <a:buChar char="-"/>
-                      </a:pPr>
-                      <a:r>
-                        <a:rPr lang="en-US" baseline="0" dirty="0" smtClean="0"/>
-                        <a:t>Rơi từ trên xuống</a:t>
-                      </a:r>
-                    </a:p>
-                    <a:p>
-                      <a:pPr marL="285750" indent="-285750">
-                        <a:buFontTx/>
-                        <a:buChar char="-"/>
-                      </a:pPr>
-                      <a:r>
-                        <a:rPr lang="en-US" baseline="0" dirty="0" smtClean="0"/>
-                        <a:t>Bật từ dưới lên</a:t>
-                      </a:r>
-                    </a:p>
-                    <a:p>
-                      <a:pPr marL="285750" indent="-285750">
-                        <a:buFontTx/>
-                        <a:buChar char="-"/>
-                      </a:pPr>
-                      <a:r>
-                        <a:rPr lang="en-US" baseline="0" dirty="0" smtClean="0"/>
-                        <a:t>Xuất hiện từ đầu</a:t>
-                      </a:r>
-                    </a:p>
-                    <a:p>
-                      <a:pPr marL="285750" indent="-285750">
-                        <a:buFontTx/>
-                        <a:buChar char="-"/>
-                      </a:pPr>
-                      <a:r>
-                        <a:rPr lang="en-US" baseline="0" dirty="0" smtClean="0"/>
-                        <a:t>Xuật hiện khi bị tương tác</a:t>
-                      </a:r>
-                      <a:endParaRPr lang="en-US" dirty="0"/>
-                    </a:p>
-                  </a:txBody>
-                  <a:tcPr/>
-                </a:tc>
-              </a:tr>
-              <a:tr h="1097522">
-                <a:tc>
-                  <a:txBody>
-                    <a:bodyPr/>
-                    <a:lstStyle/>
-                    <a:p>
-                      <a:endParaRPr lang="en-US" dirty="0"/>
-                    </a:p>
-                  </a:txBody>
-                  <a:tcPr/>
-                </a:tc>
-              </a:tr>
-            </a:tbl>
-          </a:graphicData>
-        </a:graphic>
-      </p:graphicFrame>
-      <p:pic>
-        <p:nvPicPr>
-          <p:cNvPr id="5122" name="Picture 2" descr="E:\HocTap\Documents\ThucTap\GameLoftTHUCTAP\IdealAndAsset\Asset\Pixel Adventure 1\Free\Traps\Saw\Off.png"/>
-          <p:cNvPicPr>
-            <a:picLocks noChangeAspect="1" noChangeArrowheads="1"/>
-          </p:cNvPicPr>
-          <p:nvPr/>
-        </p:nvPicPr>
-        <p:blipFill>
-          <a:blip r:embed="rId2">
-            <a:extLst>
-              <a:ext uri="{28A0092B-C50C-407E-A947-70E740481C1C}">
-                <a14:useLocalDpi xmlns:a14="http://schemas.microsoft.com/office/drawing/2010/main" val="0"/>
-              </a:ext>
-            </a:extLst>
-          </a:blip>
-          <a:srcRect/>
-          <a:stretch>
-            <a:fillRect/>
-          </a:stretch>
-        </p:blipFill>
-        <p:spPr bwMode="auto">
-          <a:xfrm>
-            <a:off x="5715000" y="1143000"/>
-            <a:ext cx="2216150" cy="2216150"/>
-          </a:xfrm>
-          <a:prstGeom prst="rect">
-            <a:avLst/>
-          </a:prstGeom>
-          <a:noFill/>
-          <a:extLst>
-            <a:ext uri="{909E8E84-426E-40DD-AFC4-6F175D3DCCD1}">
-              <a14:hiddenFill xmlns:a14="http://schemas.microsoft.com/office/drawing/2010/main">
-                <a:solidFill>
-                  <a:srgbClr val="FFFFFF"/>
-                </a:solidFill>
-              </a14:hiddenFill>
-            </a:ext>
-          </a:extLst>
-        </p:spPr>
-      </p:pic>
-      <p:pic>
-        <p:nvPicPr>
-          <p:cNvPr id="5123" name="Picture 3" descr="E:\HocTap\Documents\ThucTap\GameLoftTHUCTAP\IdealAndAsset\Asset\Pixel Adventure 1\Free\Traps\Spike Head\Idle.png"/>
-          <p:cNvPicPr>
-            <a:picLocks noChangeAspect="1" noChangeArrowheads="1"/>
-          </p:cNvPicPr>
-          <p:nvPr/>
-        </p:nvPicPr>
-        <p:blipFill>
-          <a:blip r:embed="rId3">
-            <a:extLst>
-              <a:ext uri="{28A0092B-C50C-407E-A947-70E740481C1C}">
-                <a14:useLocalDpi xmlns:a14="http://schemas.microsoft.com/office/drawing/2010/main" val="0"/>
-              </a:ext>
-            </a:extLst>
-          </a:blip>
-          <a:srcRect/>
-          <a:stretch>
-            <a:fillRect/>
-          </a:stretch>
-        </p:blipFill>
-        <p:spPr bwMode="auto">
-          <a:xfrm>
-            <a:off x="5734050" y="3947160"/>
-            <a:ext cx="2151063" cy="2071394"/>
-          </a:xfrm>
-          <a:prstGeom prst="rect">
-            <a:avLst/>
-          </a:prstGeom>
-          <a:noFill/>
-          <a:extLst>
-            <a:ext uri="{909E8E84-426E-40DD-AFC4-6F175D3DCCD1}">
-              <a14:hiddenFill xmlns:a14="http://schemas.microsoft.com/office/drawing/2010/main">
-                <a:solidFill>
-                  <a:srgbClr val="FFFFFF"/>
-                </a:solidFill>
-              </a14:hiddenFill>
-            </a:ext>
-          </a:extLst>
-        </p:spPr>
-      </p:pic>
-    </p:spTree>
-    <p:extLst>
-      <p:ext uri="{BB962C8B-B14F-4D97-AF65-F5344CB8AC3E}">
-        <p14:creationId xmlns:p14="http://schemas.microsoft.com/office/powerpoint/2010/main" val="2807715973"/>
-      </p:ext>
-    </p:extLst>
-  </p:cSld>
-  <p:clrMapOvr>
-    <a:masterClrMapping/>
-  </p:clrMapOvr>
-  <p:timing>
-    <p:tnLst>
-      <p:par>
-        <p:cTn id="1" dur="indefinite" restart="never" nodeType="tmRoot"/>
-      </p:par>
-    </p:tnLst>
-  </p:timing>
-</p:sld>
-</file>
-
-<file path=ppt/slides/slide6.xml><?xml version="1.0" encoding="utf-8"?>
-<p:sld xmlns:a="http://schemas.openxmlformats.org/drawingml/2006/main" xmlns:r="http://schemas.openxmlformats.org/officeDocument/2006/relationships" xmlns:p="http://schemas.openxmlformats.org/presentationml/2006/main">
-  <p:cSld>
-    <p:spTree>
-      <p:nvGrpSpPr>
-        <p:cNvPr id="1" name=""/>
-        <p:cNvGrpSpPr/>
-        <p:nvPr/>
-      </p:nvGrpSpPr>
-      <p:grpSpPr>
-        <a:xfrm>
-          <a:off x="0" y="0"/>
-          <a:ext cx="0" cy="0"/>
-          <a:chOff x="0" y="0"/>
-          <a:chExt cx="0" cy="0"/>
-        </a:xfrm>
-      </p:grpSpPr>
-      <p:sp>
-        <p:nvSpPr>
-          <p:cNvPr id="2" name="Title 1"/>
-          <p:cNvSpPr>
-            <a:spLocks noGrp="1"/>
-          </p:cNvSpPr>
-          <p:nvPr>
-            <p:ph type="title"/>
-          </p:nvPr>
-        </p:nvSpPr>
-        <p:spPr/>
-        <p:txBody>
-          <a:bodyPr/>
-          <a:lstStyle/>
-          <a:p>
-            <a:r>
-              <a:rPr lang="en-US" dirty="0" smtClean="0"/>
-              <a:t>Boss</a:t>
-            </a:r>
-            <a:endParaRPr lang="en-US" dirty="0"/>
-          </a:p>
-        </p:txBody>
-      </p:sp>
-      <p:graphicFrame>
-        <p:nvGraphicFramePr>
-          <p:cNvPr id="4" name="Table 3"/>
-          <p:cNvGraphicFramePr>
-            <a:graphicFrameLocks noGrp="1"/>
-          </p:cNvGraphicFramePr>
-          <p:nvPr>
-            <p:extLst>
-              <p:ext uri="{D42A27DB-BD31-4B8C-83A1-F6EECF244321}">
-                <p14:modId xmlns:p14="http://schemas.microsoft.com/office/powerpoint/2010/main" val="1623741643"/>
+                <p14:modId xmlns:p14="http://schemas.microsoft.com/office/powerpoint/2010/main" val="3809431484"/>
               </p:ext>
             </p:extLst>
           </p:nvPr>
@@ -4164,13 +3834,53 @@
                     <a:p>
                       <a:r>
                         <a:rPr lang="en-US" baseline="0" dirty="0" smtClean="0"/>
-                        <a:t>Boss có thể đứng yên, đi, chạy, đánh, tốc biến.</a:t>
+                        <a:t>Boss có thể đứng yên, đi, chạy, </a:t>
                       </a:r>
+                      <a:r>
+                        <a:rPr lang="en-US" baseline="0" dirty="0" smtClean="0"/>
+                        <a:t>đánh gần, đánh xa, </a:t>
+                      </a:r>
+                      <a:r>
+                        <a:rPr lang="en-US" baseline="0" dirty="0" smtClean="0"/>
+                        <a:t>tốc biến</a:t>
+                      </a:r>
+                      <a:r>
+                        <a:rPr lang="en-US" baseline="0" dirty="0" smtClean="0"/>
+                        <a:t>.</a:t>
+                      </a:r>
+                    </a:p>
+                    <a:p>
+                      <a:pPr marL="0" marR="0" indent="0" algn="l" defTabSz="914400" rtl="0" eaLnBrk="1" fontAlgn="auto" latinLnBrk="0" hangingPunct="1">
+                        <a:lnSpc>
+                          <a:spcPct val="100000"/>
+                        </a:lnSpc>
+                        <a:spcBef>
+                          <a:spcPts val="0"/>
+                        </a:spcBef>
+                        <a:spcAft>
+                          <a:spcPts val="0"/>
+                        </a:spcAft>
+                        <a:buClrTx/>
+                        <a:buSzTx/>
+                        <a:buFontTx/>
+                        <a:buNone/>
+                        <a:tabLst/>
+                        <a:defRPr/>
+                      </a:pPr>
+                      <a:r>
+                        <a:rPr lang="en-US" baseline="0" smtClean="0"/>
+                        <a:t>Boss có thể triệu hồi các quái khác</a:t>
+                      </a:r>
+                      <a:endParaRPr lang="en-US" baseline="0" dirty="0" smtClean="0"/>
                     </a:p>
                     <a:p>
                       <a:r>
                         <a:rPr lang="en-US" baseline="0" dirty="0" smtClean="0"/>
-                        <a:t>Boss có số máu và sát thương nhất địch.</a:t>
+                        <a:t>Boss có số máu và sát thương nhất địch</a:t>
+                      </a:r>
+                      <a:r>
+                        <a:rPr lang="en-US" baseline="0" dirty="0" smtClean="0"/>
+                        <a:t>.</a:t>
                       </a:r>
                     </a:p>
                   </a:txBody>
@@ -4266,7 +3976,7 @@
 </p:sld>
 </file>
 
-<file path=ppt/slides/slide7.xml><?xml version="1.0" encoding="utf-8"?>
+<file path=ppt/slides/slide6.xml><?xml version="1.0" encoding="utf-8"?>
 <p:sld xmlns:a="http://schemas.openxmlformats.org/drawingml/2006/main" xmlns:r="http://schemas.openxmlformats.org/officeDocument/2006/relationships" xmlns:p="http://schemas.openxmlformats.org/presentationml/2006/main">
   <p:cSld>
     <p:spTree>
@@ -4350,7 +4060,7 @@
         </p:nvSpPr>
         <p:spPr>
           <a:xfrm>
-            <a:off x="762000" y="1524000"/>
+            <a:off x="739140" y="1524000"/>
             <a:ext cx="7315200" cy="923330"/>
           </a:xfrm>
           <a:prstGeom prst="rect">

</xml_diff>

<commit_message>
Update Slide, delete Save File
</commit_message>
<xml_diff>
--- a/RELEASE and DESIGN/Design/IdealGame.pptx
+++ b/RELEASE and DESIGN/Design/IdealGame.pptx
@@ -12,7 +12,10 @@
     <p:sldId id="261" r:id="rId6"/>
     <p:sldId id="262" r:id="rId7"/>
     <p:sldId id="263" r:id="rId8"/>
-    <p:sldId id="258" r:id="rId9"/>
+    <p:sldId id="264" r:id="rId9"/>
+    <p:sldId id="265" r:id="rId10"/>
+    <p:sldId id="266" r:id="rId11"/>
+    <p:sldId id="258" r:id="rId12"/>
   </p:sldIdLst>
   <p:sldSz cx="9144000" cy="6858000" type="screen4x3"/>
   <p:notesSz cx="6858000" cy="9144000"/>
@@ -296,7 +299,7 @@
             <a:fld id="{1D8BD707-D9CF-40AE-B4C6-C98DA3205C09}" type="datetimeFigureOut">
               <a:rPr lang="en-US" smtClean="0"/>
               <a:pPr/>
-              <a:t>9/13/2020</a:t>
+              <a:t>9/14/2020</a:t>
             </a:fld>
             <a:endParaRPr lang="en-US"/>
           </a:p>
@@ -463,7 +466,7 @@
             <a:fld id="{1D8BD707-D9CF-40AE-B4C6-C98DA3205C09}" type="datetimeFigureOut">
               <a:rPr lang="en-US" smtClean="0"/>
               <a:pPr/>
-              <a:t>9/13/2020</a:t>
+              <a:t>9/14/2020</a:t>
             </a:fld>
             <a:endParaRPr lang="en-US"/>
           </a:p>
@@ -640,7 +643,7 @@
             <a:fld id="{1D8BD707-D9CF-40AE-B4C6-C98DA3205C09}" type="datetimeFigureOut">
               <a:rPr lang="en-US" smtClean="0"/>
               <a:pPr/>
-              <a:t>9/13/2020</a:t>
+              <a:t>9/14/2020</a:t>
             </a:fld>
             <a:endParaRPr lang="en-US"/>
           </a:p>
@@ -807,7 +810,7 @@
             <a:fld id="{1D8BD707-D9CF-40AE-B4C6-C98DA3205C09}" type="datetimeFigureOut">
               <a:rPr lang="en-US" smtClean="0"/>
               <a:pPr/>
-              <a:t>9/13/2020</a:t>
+              <a:t>9/14/2020</a:t>
             </a:fld>
             <a:endParaRPr lang="en-US"/>
           </a:p>
@@ -1050,7 +1053,7 @@
             <a:fld id="{1D8BD707-D9CF-40AE-B4C6-C98DA3205C09}" type="datetimeFigureOut">
               <a:rPr lang="en-US" smtClean="0"/>
               <a:pPr/>
-              <a:t>9/13/2020</a:t>
+              <a:t>9/14/2020</a:t>
             </a:fld>
             <a:endParaRPr lang="en-US"/>
           </a:p>
@@ -1335,7 +1338,7 @@
             <a:fld id="{1D8BD707-D9CF-40AE-B4C6-C98DA3205C09}" type="datetimeFigureOut">
               <a:rPr lang="en-US" smtClean="0"/>
               <a:pPr/>
-              <a:t>9/13/2020</a:t>
+              <a:t>9/14/2020</a:t>
             </a:fld>
             <a:endParaRPr lang="en-US"/>
           </a:p>
@@ -1754,7 +1757,7 @@
             <a:fld id="{1D8BD707-D9CF-40AE-B4C6-C98DA3205C09}" type="datetimeFigureOut">
               <a:rPr lang="en-US" smtClean="0"/>
               <a:pPr/>
-              <a:t>9/13/2020</a:t>
+              <a:t>9/14/2020</a:t>
             </a:fld>
             <a:endParaRPr lang="en-US"/>
           </a:p>
@@ -1869,7 +1872,7 @@
             <a:fld id="{1D8BD707-D9CF-40AE-B4C6-C98DA3205C09}" type="datetimeFigureOut">
               <a:rPr lang="en-US" smtClean="0"/>
               <a:pPr/>
-              <a:t>9/13/2020</a:t>
+              <a:t>9/14/2020</a:t>
             </a:fld>
             <a:endParaRPr lang="en-US"/>
           </a:p>
@@ -1961,7 +1964,7 @@
             <a:fld id="{1D8BD707-D9CF-40AE-B4C6-C98DA3205C09}" type="datetimeFigureOut">
               <a:rPr lang="en-US" smtClean="0"/>
               <a:pPr/>
-              <a:t>9/13/2020</a:t>
+              <a:t>9/14/2020</a:t>
             </a:fld>
             <a:endParaRPr lang="en-US"/>
           </a:p>
@@ -2235,7 +2238,7 @@
             <a:fld id="{1D8BD707-D9CF-40AE-B4C6-C98DA3205C09}" type="datetimeFigureOut">
               <a:rPr lang="en-US" smtClean="0"/>
               <a:pPr/>
-              <a:t>9/13/2020</a:t>
+              <a:t>9/14/2020</a:t>
             </a:fld>
             <a:endParaRPr lang="en-US"/>
           </a:p>
@@ -2485,7 +2488,7 @@
             <a:fld id="{1D8BD707-D9CF-40AE-B4C6-C98DA3205C09}" type="datetimeFigureOut">
               <a:rPr lang="en-US" smtClean="0"/>
               <a:pPr/>
-              <a:t>9/13/2020</a:t>
+              <a:t>9/14/2020</a:t>
             </a:fld>
             <a:endParaRPr lang="en-US"/>
           </a:p>
@@ -2695,7 +2698,7 @@
             <a:fld id="{1D8BD707-D9CF-40AE-B4C6-C98DA3205C09}" type="datetimeFigureOut">
               <a:rPr lang="en-US" smtClean="0"/>
               <a:pPr/>
-              <a:t>9/13/2020</a:t>
+              <a:t>9/14/2020</a:t>
             </a:fld>
             <a:endParaRPr lang="en-US"/>
           </a:p>
@@ -3149,6 +3152,303 @@
 </p:sld>
 </file>
 
+<file path=ppt/slides/slide10.xml><?xml version="1.0" encoding="utf-8"?>
+<p:sld xmlns:a="http://schemas.openxmlformats.org/drawingml/2006/main" xmlns:r="http://schemas.openxmlformats.org/officeDocument/2006/relationships" xmlns:p="http://schemas.openxmlformats.org/presentationml/2006/main">
+  <p:cSld>
+    <p:spTree>
+      <p:nvGrpSpPr>
+        <p:cNvPr id="1" name=""/>
+        <p:cNvGrpSpPr/>
+        <p:nvPr/>
+      </p:nvGrpSpPr>
+      <p:grpSpPr>
+        <a:xfrm>
+          <a:off x="0" y="0"/>
+          <a:ext cx="0" cy="0"/>
+          <a:chOff x="0" y="0"/>
+          <a:chExt cx="0" cy="0"/>
+        </a:xfrm>
+      </p:grpSpPr>
+      <p:sp>
+        <p:nvSpPr>
+          <p:cNvPr id="4" name="TextBox 3"/>
+          <p:cNvSpPr txBox="1"/>
+          <p:nvPr/>
+        </p:nvSpPr>
+        <p:spPr>
+          <a:xfrm>
+            <a:off x="4114800" y="2971800"/>
+            <a:ext cx="184731" cy="369332"/>
+          </a:xfrm>
+          <a:prstGeom prst="rect">
+            <a:avLst/>
+          </a:prstGeom>
+          <a:noFill/>
+        </p:spPr>
+        <p:txBody>
+          <a:bodyPr wrap="none" rtlCol="0">
+            <a:spAutoFit/>
+          </a:bodyPr>
+          <a:lstStyle/>
+          <a:p>
+            <a:endParaRPr lang="en-US" dirty="0"/>
+          </a:p>
+        </p:txBody>
+      </p:sp>
+      <p:pic>
+        <p:nvPicPr>
+          <p:cNvPr id="4098" name="Picture 2"/>
+          <p:cNvPicPr>
+            <a:picLocks noChangeAspect="1" noChangeArrowheads="1"/>
+          </p:cNvPicPr>
+          <p:nvPr/>
+        </p:nvPicPr>
+        <p:blipFill>
+          <a:blip r:embed="rId2">
+            <a:extLst>
+              <a:ext uri="{28A0092B-C50C-407E-A947-70E740481C1C}">
+                <a14:useLocalDpi xmlns:a14="http://schemas.microsoft.com/office/drawing/2010/main" val="0"/>
+              </a:ext>
+            </a:extLst>
+          </a:blip>
+          <a:srcRect/>
+          <a:stretch>
+            <a:fillRect/>
+          </a:stretch>
+        </p:blipFill>
+        <p:spPr bwMode="auto">
+          <a:xfrm>
+            <a:off x="685800" y="1219200"/>
+            <a:ext cx="7707313" cy="4590706"/>
+          </a:xfrm>
+          <a:prstGeom prst="rect">
+            <a:avLst/>
+          </a:prstGeom>
+          <a:noFill/>
+          <a:ln>
+            <a:noFill/>
+          </a:ln>
+          <a:effectLst/>
+          <a:extLst>
+            <a:ext uri="{909E8E84-426E-40DD-AFC4-6F175D3DCCD1}">
+              <a14:hiddenFill xmlns:a14="http://schemas.microsoft.com/office/drawing/2010/main">
+                <a:solidFill>
+                  <a:schemeClr val="accent1"/>
+                </a:solidFill>
+              </a14:hiddenFill>
+            </a:ext>
+            <a:ext uri="{91240B29-F687-4F45-9708-019B960494DF}">
+              <a14:hiddenLine xmlns:a14="http://schemas.microsoft.com/office/drawing/2010/main" w="9525">
+                <a:solidFill>
+                  <a:schemeClr val="tx1"/>
+                </a:solidFill>
+                <a:miter lim="800000"/>
+                <a:headEnd/>
+                <a:tailEnd/>
+              </a14:hiddenLine>
+            </a:ext>
+            <a:ext uri="{AF507438-7753-43E0-B8FC-AC1667EBCBE1}">
+              <a14:hiddenEffects xmlns:a14="http://schemas.microsoft.com/office/drawing/2010/main">
+                <a:effectLst>
+                  <a:outerShdw dist="35921" dir="2700000" algn="ctr" rotWithShape="0">
+                    <a:schemeClr val="bg2"/>
+                  </a:outerShdw>
+                </a:effectLst>
+              </a14:hiddenEffects>
+            </a:ext>
+          </a:extLst>
+        </p:spPr>
+      </p:pic>
+    </p:spTree>
+    <p:extLst>
+      <p:ext uri="{BB962C8B-B14F-4D97-AF65-F5344CB8AC3E}">
+        <p14:creationId xmlns:p14="http://schemas.microsoft.com/office/powerpoint/2010/main" val="2007116160"/>
+      </p:ext>
+    </p:extLst>
+  </p:cSld>
+  <p:clrMapOvr>
+    <a:masterClrMapping/>
+  </p:clrMapOvr>
+  <p:timing>
+    <p:tnLst>
+      <p:par>
+        <p:cTn id="1" dur="indefinite" restart="never" nodeType="tmRoot"/>
+      </p:par>
+    </p:tnLst>
+  </p:timing>
+</p:sld>
+</file>
+
+<file path=ppt/slides/slide11.xml><?xml version="1.0" encoding="utf-8"?>
+<p:sld xmlns:a="http://schemas.openxmlformats.org/drawingml/2006/main" xmlns:r="http://schemas.openxmlformats.org/officeDocument/2006/relationships" xmlns:p="http://schemas.openxmlformats.org/presentationml/2006/main">
+  <p:cSld>
+    <p:spTree>
+      <p:nvGrpSpPr>
+        <p:cNvPr id="1" name=""/>
+        <p:cNvGrpSpPr/>
+        <p:nvPr/>
+      </p:nvGrpSpPr>
+      <p:grpSpPr>
+        <a:xfrm>
+          <a:off x="0" y="0"/>
+          <a:ext cx="0" cy="0"/>
+          <a:chOff x="0" y="0"/>
+          <a:chExt cx="0" cy="0"/>
+        </a:xfrm>
+      </p:grpSpPr>
+      <p:sp>
+        <p:nvSpPr>
+          <p:cNvPr id="2" name="Title 1"/>
+          <p:cNvSpPr>
+            <a:spLocks noGrp="1"/>
+          </p:cNvSpPr>
+          <p:nvPr>
+            <p:ph type="title"/>
+          </p:nvPr>
+        </p:nvSpPr>
+        <p:spPr/>
+        <p:txBody>
+          <a:bodyPr/>
+          <a:lstStyle/>
+          <a:p>
+            <a:r>
+              <a:rPr lang="en-US" dirty="0" smtClean="0"/>
+              <a:t>Asset</a:t>
+            </a:r>
+            <a:endParaRPr lang="en-US" dirty="0"/>
+          </a:p>
+        </p:txBody>
+      </p:sp>
+      <p:sp>
+        <p:nvSpPr>
+          <p:cNvPr id="3" name="Content Placeholder 2"/>
+          <p:cNvSpPr>
+            <a:spLocks noGrp="1"/>
+          </p:cNvSpPr>
+          <p:nvPr>
+            <p:ph idx="1"/>
+          </p:nvPr>
+        </p:nvSpPr>
+        <p:spPr/>
+        <p:txBody>
+          <a:bodyPr>
+            <a:normAutofit/>
+          </a:bodyPr>
+          <a:lstStyle/>
+          <a:p>
+            <a:r>
+              <a:rPr lang="en-US" sz="2000" dirty="0" smtClean="0">
+                <a:solidFill>
+                  <a:schemeClr val="bg1"/>
+                </a:solidFill>
+              </a:rPr>
+              <a:t>https</a:t>
+            </a:r>
+            <a:r>
+              <a:rPr lang="en-US" sz="2000" dirty="0">
+                <a:solidFill>
+                  <a:schemeClr val="bg1"/>
+                </a:solidFill>
+              </a:rPr>
+              <a:t>://luizmelo.itch.io/martial-hero</a:t>
+            </a:r>
+          </a:p>
+        </p:txBody>
+      </p:sp>
+      <p:sp>
+        <p:nvSpPr>
+          <p:cNvPr id="5" name="TextBox 4"/>
+          <p:cNvSpPr txBox="1"/>
+          <p:nvPr/>
+        </p:nvSpPr>
+        <p:spPr>
+          <a:xfrm>
+            <a:off x="739140" y="1524000"/>
+            <a:ext cx="7315200" cy="1200329"/>
+          </a:xfrm>
+          <a:prstGeom prst="rect">
+            <a:avLst/>
+          </a:prstGeom>
+          <a:noFill/>
+        </p:spPr>
+        <p:txBody>
+          <a:bodyPr wrap="square" rtlCol="0">
+            <a:spAutoFit/>
+          </a:bodyPr>
+          <a:lstStyle/>
+          <a:p>
+            <a:r>
+              <a:rPr lang="en-US" dirty="0">
+                <a:hlinkClick r:id="rId2"/>
+              </a:rPr>
+              <a:t>https://</a:t>
+            </a:r>
+            <a:r>
+              <a:rPr lang="en-US" dirty="0" smtClean="0">
+                <a:hlinkClick r:id="rId2"/>
+              </a:rPr>
+              <a:t>luizmelo.itch.io/martial-hero</a:t>
+            </a:r>
+            <a:endParaRPr lang="en-US" dirty="0" smtClean="0"/>
+          </a:p>
+          <a:p>
+            <a:r>
+              <a:rPr lang="en-US" dirty="0">
+                <a:hlinkClick r:id="rId3"/>
+              </a:rPr>
+              <a:t>https://</a:t>
+            </a:r>
+            <a:r>
+              <a:rPr lang="en-US" dirty="0" smtClean="0">
+                <a:hlinkClick r:id="rId3"/>
+              </a:rPr>
+              <a:t>pixel-frog.itch.io/pixel-adventure-1</a:t>
+            </a:r>
+            <a:endParaRPr lang="en-US" dirty="0" smtClean="0"/>
+          </a:p>
+          <a:p>
+            <a:r>
+              <a:rPr lang="en-US" dirty="0">
+                <a:hlinkClick r:id="rId4"/>
+              </a:rPr>
+              <a:t>https://</a:t>
+            </a:r>
+            <a:r>
+              <a:rPr lang="en-US" dirty="0" smtClean="0">
+                <a:hlinkClick r:id="rId4"/>
+              </a:rPr>
+              <a:t>luizmelo.itch.io/evil-wizard-2</a:t>
+            </a:r>
+            <a:endParaRPr lang="en-US" dirty="0" smtClean="0"/>
+          </a:p>
+          <a:p>
+            <a:r>
+              <a:rPr lang="en-US" dirty="0"/>
+              <a:t>https://oco.itch.io/medieval-fantasy-character-pack-3</a:t>
+            </a:r>
+          </a:p>
+        </p:txBody>
+      </p:sp>
+    </p:spTree>
+    <p:extLst>
+      <p:ext uri="{BB962C8B-B14F-4D97-AF65-F5344CB8AC3E}">
+        <p14:creationId xmlns:p14="http://schemas.microsoft.com/office/powerpoint/2010/main" val="2947180904"/>
+      </p:ext>
+    </p:extLst>
+  </p:cSld>
+  <p:clrMapOvr>
+    <a:masterClrMapping/>
+  </p:clrMapOvr>
+  <p:timing>
+    <p:tnLst>
+      <p:par>
+        <p:cTn id="1" dur="indefinite" restart="never" nodeType="tmRoot"/>
+      </p:par>
+    </p:tnLst>
+  </p:timing>
+</p:sld>
+</file>
+
 <file path=ppt/slides/slide2.xml><?xml version="1.0" encoding="utf-8"?>
 <p:sld xmlns:a="http://schemas.openxmlformats.org/drawingml/2006/main" xmlns:r="http://schemas.openxmlformats.org/officeDocument/2006/relationships" xmlns:p="http://schemas.openxmlformats.org/presentationml/2006/main">
   <p:cSld>
@@ -3592,11 +3892,7 @@
           <a:p>
             <a:r>
               <a:rPr lang="en-US" dirty="0" smtClean="0"/>
-              <a:t>Kẻ </a:t>
-            </a:r>
-            <a:r>
-              <a:rPr lang="en-US" dirty="0" smtClean="0"/>
-              <a:t>Địch</a:t>
+              <a:t>Kẻ Địch</a:t>
             </a:r>
             <a:endParaRPr lang="en-US" dirty="0"/>
           </a:p>
@@ -4040,7 +4336,15 @@
           <a:p>
             <a:r>
               <a:rPr lang="en-US" dirty="0" smtClean="0"/>
-              <a:t>Người chơi sẽ đi qua 5 màn chơi được sinh ngẫu nhiên sẽ gặp </a:t>
+              <a:t>Người chơi sẽ đi qua </a:t>
+            </a:r>
+            <a:r>
+              <a:rPr lang="en-US" dirty="0" smtClean="0"/>
+              <a:t>8 </a:t>
+            </a:r>
+            <a:r>
+              <a:rPr lang="en-US" dirty="0" smtClean="0"/>
+              <a:t>màn chơi được sinh ngẫu nhiên sẽ gặp </a:t>
             </a:r>
             <a:r>
               <a:rPr lang="en-US" dirty="0"/>
@@ -4190,12 +4494,102 @@
           <a:p>
             <a:r>
               <a:rPr lang="en-US" dirty="0" smtClean="0"/>
-              <a:t>Game</a:t>
+              <a:t>Demo Game</a:t>
             </a:r>
             <a:endParaRPr lang="en-US" dirty="0"/>
           </a:p>
         </p:txBody>
       </p:sp>
+      <p:sp>
+        <p:nvSpPr>
+          <p:cNvPr id="4" name="TextBox 3"/>
+          <p:cNvSpPr txBox="1"/>
+          <p:nvPr/>
+        </p:nvSpPr>
+        <p:spPr>
+          <a:xfrm>
+            <a:off x="4114800" y="2971800"/>
+            <a:ext cx="184731" cy="369332"/>
+          </a:xfrm>
+          <a:prstGeom prst="rect">
+            <a:avLst/>
+          </a:prstGeom>
+          <a:noFill/>
+        </p:spPr>
+        <p:txBody>
+          <a:bodyPr wrap="none" rtlCol="0">
+            <a:spAutoFit/>
+          </a:bodyPr>
+          <a:lstStyle/>
+          <a:p>
+            <a:endParaRPr lang="en-US" dirty="0"/>
+          </a:p>
+        </p:txBody>
+      </p:sp>
+      <p:pic>
+        <p:nvPicPr>
+          <p:cNvPr id="1026" name="Picture 2"/>
+          <p:cNvPicPr>
+            <a:picLocks noChangeAspect="1" noChangeArrowheads="1"/>
+          </p:cNvPicPr>
+          <p:nvPr/>
+        </p:nvPicPr>
+        <p:blipFill>
+          <a:blip r:embed="rId2">
+            <a:extLst>
+              <a:ext uri="{28A0092B-C50C-407E-A947-70E740481C1C}">
+                <a14:useLocalDpi xmlns:a14="http://schemas.microsoft.com/office/drawing/2010/main" val="0"/>
+              </a:ext>
+            </a:extLst>
+          </a:blip>
+          <a:srcRect/>
+          <a:stretch>
+            <a:fillRect/>
+          </a:stretch>
+        </p:blipFill>
+        <p:spPr bwMode="auto">
+          <a:xfrm>
+            <a:off x="838200" y="1676400"/>
+            <a:ext cx="7696200" cy="4597507"/>
+          </a:xfrm>
+          <a:prstGeom prst="rect">
+            <a:avLst/>
+          </a:prstGeom>
+          <a:noFill/>
+          <a:ln>
+            <a:noFill/>
+          </a:ln>
+          <a:effectLst/>
+          <a:extLst>
+            <a:ext uri="{909E8E84-426E-40DD-AFC4-6F175D3DCCD1}">
+              <a14:hiddenFill xmlns:a14="http://schemas.microsoft.com/office/drawing/2010/main">
+                <a:solidFill>
+                  <a:schemeClr val="accent1"/>
+                </a:solidFill>
+              </a14:hiddenFill>
+            </a:ext>
+            <a:ext uri="{91240B29-F687-4F45-9708-019B960494DF}">
+              <a14:hiddenLine xmlns:a14="http://schemas.microsoft.com/office/drawing/2010/main" w="9525">
+                <a:solidFill>
+                  <a:schemeClr val="tx1"/>
+                </a:solidFill>
+                <a:miter lim="800000"/>
+                <a:headEnd/>
+                <a:tailEnd/>
+              </a14:hiddenLine>
+            </a:ext>
+            <a:ext uri="{AF507438-7753-43E0-B8FC-AC1667EBCBE1}">
+              <a14:hiddenEffects xmlns:a14="http://schemas.microsoft.com/office/drawing/2010/main">
+                <a:effectLst>
+                  <a:outerShdw dist="35921" dir="2700000" algn="ctr" rotWithShape="0">
+                    <a:schemeClr val="bg2"/>
+                  </a:outerShdw>
+                </a:effectLst>
+              </a14:hiddenEffects>
+            </a:ext>
+          </a:extLst>
+        </p:spPr>
+      </p:pic>
     </p:spTree>
     <p:extLst>
       <p:ext uri="{BB962C8B-B14F-4D97-AF65-F5344CB8AC3E}">
@@ -4235,73 +4629,14 @@
       </p:grpSpPr>
       <p:sp>
         <p:nvSpPr>
-          <p:cNvPr id="2" name="Title 1"/>
-          <p:cNvSpPr>
-            <a:spLocks noGrp="1"/>
-          </p:cNvSpPr>
-          <p:nvPr>
-            <p:ph type="title"/>
-          </p:nvPr>
-        </p:nvSpPr>
-        <p:spPr/>
-        <p:txBody>
-          <a:bodyPr/>
-          <a:lstStyle/>
-          <a:p>
-            <a:r>
-              <a:rPr lang="en-US" dirty="0" smtClean="0"/>
-              <a:t>Asset</a:t>
-            </a:r>
-            <a:endParaRPr lang="en-US" dirty="0"/>
-          </a:p>
-        </p:txBody>
-      </p:sp>
-      <p:sp>
-        <p:nvSpPr>
-          <p:cNvPr id="3" name="Content Placeholder 2"/>
-          <p:cNvSpPr>
-            <a:spLocks noGrp="1"/>
-          </p:cNvSpPr>
-          <p:nvPr>
-            <p:ph idx="1"/>
-          </p:nvPr>
-        </p:nvSpPr>
-        <p:spPr/>
-        <p:txBody>
-          <a:bodyPr>
-            <a:normAutofit/>
-          </a:bodyPr>
-          <a:lstStyle/>
-          <a:p>
-            <a:r>
-              <a:rPr lang="en-US" sz="2000" dirty="0" smtClean="0">
-                <a:solidFill>
-                  <a:schemeClr val="bg1"/>
-                </a:solidFill>
-              </a:rPr>
-              <a:t>https</a:t>
-            </a:r>
-            <a:r>
-              <a:rPr lang="en-US" sz="2000" dirty="0">
-                <a:solidFill>
-                  <a:schemeClr val="bg1"/>
-                </a:solidFill>
-              </a:rPr>
-              <a:t>://luizmelo.itch.io/martial-hero</a:t>
-            </a:r>
-          </a:p>
-        </p:txBody>
-      </p:sp>
-      <p:sp>
-        <p:nvSpPr>
-          <p:cNvPr id="5" name="TextBox 4"/>
+          <p:cNvPr id="4" name="TextBox 3"/>
           <p:cNvSpPr txBox="1"/>
           <p:nvPr/>
         </p:nvSpPr>
         <p:spPr>
           <a:xfrm>
-            <a:off x="739140" y="1524000"/>
-            <a:ext cx="7315200" cy="1200329"/>
+            <a:off x="4114800" y="2971800"/>
+            <a:ext cx="184731" cy="369332"/>
           </a:xfrm>
           <a:prstGeom prst="rect">
             <a:avLst/>
@@ -4309,68 +4644,210 @@
           <a:noFill/>
         </p:spPr>
         <p:txBody>
-          <a:bodyPr wrap="square" rtlCol="0">
+          <a:bodyPr wrap="none" rtlCol="0">
             <a:spAutoFit/>
           </a:bodyPr>
           <a:lstStyle/>
           <a:p>
-            <a:r>
-              <a:rPr lang="en-US" dirty="0">
-                <a:hlinkClick r:id="rId2"/>
-              </a:rPr>
-              <a:t>https://</a:t>
-            </a:r>
-            <a:r>
-              <a:rPr lang="en-US" dirty="0" smtClean="0">
-                <a:hlinkClick r:id="rId2"/>
-              </a:rPr>
-              <a:t>luizmelo.itch.io/martial-hero</a:t>
-            </a:r>
-            <a:endParaRPr lang="en-US" dirty="0" smtClean="0"/>
-          </a:p>
-          <a:p>
-            <a:r>
-              <a:rPr lang="en-US" dirty="0">
-                <a:hlinkClick r:id="rId3"/>
-              </a:rPr>
-              <a:t>https://</a:t>
-            </a:r>
-            <a:r>
-              <a:rPr lang="en-US" dirty="0" smtClean="0">
-                <a:hlinkClick r:id="rId3"/>
-              </a:rPr>
-              <a:t>pixel-frog.itch.io/pixel-adventure-1</a:t>
-            </a:r>
-            <a:endParaRPr lang="en-US" dirty="0" smtClean="0"/>
-          </a:p>
-          <a:p>
-            <a:r>
-              <a:rPr lang="en-US" dirty="0">
-                <a:hlinkClick r:id="rId4"/>
-              </a:rPr>
-              <a:t>https://</a:t>
-            </a:r>
-            <a:r>
-              <a:rPr lang="en-US" dirty="0" smtClean="0">
-                <a:hlinkClick r:id="rId4"/>
-              </a:rPr>
-              <a:t>luizmelo.itch.io/evil-wizard-2</a:t>
-            </a:r>
-            <a:endParaRPr lang="en-US" dirty="0" smtClean="0"/>
-          </a:p>
-          <a:p>
-            <a:r>
-              <a:rPr lang="en-US" dirty="0"/>
-              <a:t>https://oco.itch.io/medieval-fantasy-character-pack-3</a:t>
-            </a:r>
             <a:endParaRPr lang="en-US" dirty="0"/>
           </a:p>
         </p:txBody>
       </p:sp>
+      <p:pic>
+        <p:nvPicPr>
+          <p:cNvPr id="2050" name="Picture 2"/>
+          <p:cNvPicPr>
+            <a:picLocks noChangeAspect="1" noChangeArrowheads="1"/>
+          </p:cNvPicPr>
+          <p:nvPr/>
+        </p:nvPicPr>
+        <p:blipFill>
+          <a:blip r:embed="rId2">
+            <a:extLst>
+              <a:ext uri="{28A0092B-C50C-407E-A947-70E740481C1C}">
+                <a14:useLocalDpi xmlns:a14="http://schemas.microsoft.com/office/drawing/2010/main" val="0"/>
+              </a:ext>
+            </a:extLst>
+          </a:blip>
+          <a:srcRect/>
+          <a:stretch>
+            <a:fillRect/>
+          </a:stretch>
+        </p:blipFill>
+        <p:spPr bwMode="auto">
+          <a:xfrm>
+            <a:off x="762000" y="1066800"/>
+            <a:ext cx="8064500" cy="4803317"/>
+          </a:xfrm>
+          <a:prstGeom prst="rect">
+            <a:avLst/>
+          </a:prstGeom>
+          <a:noFill/>
+          <a:ln>
+            <a:noFill/>
+          </a:ln>
+          <a:effectLst/>
+          <a:extLst>
+            <a:ext uri="{909E8E84-426E-40DD-AFC4-6F175D3DCCD1}">
+              <a14:hiddenFill xmlns:a14="http://schemas.microsoft.com/office/drawing/2010/main">
+                <a:solidFill>
+                  <a:schemeClr val="accent1"/>
+                </a:solidFill>
+              </a14:hiddenFill>
+            </a:ext>
+            <a:ext uri="{91240B29-F687-4F45-9708-019B960494DF}">
+              <a14:hiddenLine xmlns:a14="http://schemas.microsoft.com/office/drawing/2010/main" w="9525">
+                <a:solidFill>
+                  <a:schemeClr val="tx1"/>
+                </a:solidFill>
+                <a:miter lim="800000"/>
+                <a:headEnd/>
+                <a:tailEnd/>
+              </a14:hiddenLine>
+            </a:ext>
+            <a:ext uri="{AF507438-7753-43E0-B8FC-AC1667EBCBE1}">
+              <a14:hiddenEffects xmlns:a14="http://schemas.microsoft.com/office/drawing/2010/main">
+                <a:effectLst>
+                  <a:outerShdw dist="35921" dir="2700000" algn="ctr" rotWithShape="0">
+                    <a:schemeClr val="bg2"/>
+                  </a:outerShdw>
+                </a:effectLst>
+              </a14:hiddenEffects>
+            </a:ext>
+          </a:extLst>
+        </p:spPr>
+      </p:pic>
     </p:spTree>
     <p:extLst>
       <p:ext uri="{BB962C8B-B14F-4D97-AF65-F5344CB8AC3E}">
-        <p14:creationId xmlns:p14="http://schemas.microsoft.com/office/powerpoint/2010/main" val="2947180904"/>
+        <p14:creationId xmlns:p14="http://schemas.microsoft.com/office/powerpoint/2010/main" val="1366227859"/>
+      </p:ext>
+    </p:extLst>
+  </p:cSld>
+  <p:clrMapOvr>
+    <a:masterClrMapping/>
+  </p:clrMapOvr>
+  <p:timing>
+    <p:tnLst>
+      <p:par>
+        <p:cTn id="1" dur="indefinite" restart="never" nodeType="tmRoot"/>
+      </p:par>
+    </p:tnLst>
+  </p:timing>
+</p:sld>
+</file>
+
+<file path=ppt/slides/slide9.xml><?xml version="1.0" encoding="utf-8"?>
+<p:sld xmlns:a="http://schemas.openxmlformats.org/drawingml/2006/main" xmlns:r="http://schemas.openxmlformats.org/officeDocument/2006/relationships" xmlns:p="http://schemas.openxmlformats.org/presentationml/2006/main">
+  <p:cSld>
+    <p:spTree>
+      <p:nvGrpSpPr>
+        <p:cNvPr id="1" name=""/>
+        <p:cNvGrpSpPr/>
+        <p:nvPr/>
+      </p:nvGrpSpPr>
+      <p:grpSpPr>
+        <a:xfrm>
+          <a:off x="0" y="0"/>
+          <a:ext cx="0" cy="0"/>
+          <a:chOff x="0" y="0"/>
+          <a:chExt cx="0" cy="0"/>
+        </a:xfrm>
+      </p:grpSpPr>
+      <p:sp>
+        <p:nvSpPr>
+          <p:cNvPr id="4" name="TextBox 3"/>
+          <p:cNvSpPr txBox="1"/>
+          <p:nvPr/>
+        </p:nvSpPr>
+        <p:spPr>
+          <a:xfrm>
+            <a:off x="4114800" y="2971800"/>
+            <a:ext cx="184731" cy="369332"/>
+          </a:xfrm>
+          <a:prstGeom prst="rect">
+            <a:avLst/>
+          </a:prstGeom>
+          <a:noFill/>
+        </p:spPr>
+        <p:txBody>
+          <a:bodyPr wrap="none" rtlCol="0">
+            <a:spAutoFit/>
+          </a:bodyPr>
+          <a:lstStyle/>
+          <a:p>
+            <a:endParaRPr lang="en-US" dirty="0"/>
+          </a:p>
+        </p:txBody>
+      </p:sp>
+      <p:pic>
+        <p:nvPicPr>
+          <p:cNvPr id="3074" name="Picture 2"/>
+          <p:cNvPicPr>
+            <a:picLocks noChangeAspect="1" noChangeArrowheads="1"/>
+          </p:cNvPicPr>
+          <p:nvPr/>
+        </p:nvPicPr>
+        <p:blipFill>
+          <a:blip r:embed="rId2">
+            <a:extLst>
+              <a:ext uri="{28A0092B-C50C-407E-A947-70E740481C1C}">
+                <a14:useLocalDpi xmlns:a14="http://schemas.microsoft.com/office/drawing/2010/main" val="0"/>
+              </a:ext>
+            </a:extLst>
+          </a:blip>
+          <a:srcRect/>
+          <a:stretch>
+            <a:fillRect/>
+          </a:stretch>
+        </p:blipFill>
+        <p:spPr bwMode="auto">
+          <a:xfrm>
+            <a:off x="636270" y="1143000"/>
+            <a:ext cx="7950200" cy="4749240"/>
+          </a:xfrm>
+          <a:prstGeom prst="rect">
+            <a:avLst/>
+          </a:prstGeom>
+          <a:noFill/>
+          <a:ln>
+            <a:noFill/>
+          </a:ln>
+          <a:effectLst/>
+          <a:extLst>
+            <a:ext uri="{909E8E84-426E-40DD-AFC4-6F175D3DCCD1}">
+              <a14:hiddenFill xmlns:a14="http://schemas.microsoft.com/office/drawing/2010/main">
+                <a:solidFill>
+                  <a:schemeClr val="accent1"/>
+                </a:solidFill>
+              </a14:hiddenFill>
+            </a:ext>
+            <a:ext uri="{91240B29-F687-4F45-9708-019B960494DF}">
+              <a14:hiddenLine xmlns:a14="http://schemas.microsoft.com/office/drawing/2010/main" w="9525">
+                <a:solidFill>
+                  <a:schemeClr val="tx1"/>
+                </a:solidFill>
+                <a:miter lim="800000"/>
+                <a:headEnd/>
+                <a:tailEnd/>
+              </a14:hiddenLine>
+            </a:ext>
+            <a:ext uri="{AF507438-7753-43E0-B8FC-AC1667EBCBE1}">
+              <a14:hiddenEffects xmlns:a14="http://schemas.microsoft.com/office/drawing/2010/main">
+                <a:effectLst>
+                  <a:outerShdw dist="35921" dir="2700000" algn="ctr" rotWithShape="0">
+                    <a:schemeClr val="bg2"/>
+                  </a:outerShdw>
+                </a:effectLst>
+              </a14:hiddenEffects>
+            </a:ext>
+          </a:extLst>
+        </p:spPr>
+      </p:pic>
+    </p:spTree>
+    <p:extLst>
+      <p:ext uri="{BB962C8B-B14F-4D97-AF65-F5344CB8AC3E}">
+        <p14:creationId xmlns:p14="http://schemas.microsoft.com/office/powerpoint/2010/main" val="2990184172"/>
       </p:ext>
     </p:extLst>
   </p:cSld>

</xml_diff>